<commit_message>
Extra informatie toegevoegd aan de Plus missie sheet over dobbelen/random
</commit_message>
<xml_diff>
--- a/Devoxx4Kids Mindstorms Workshop NL.pptx
+++ b/Devoxx4Kids Mindstorms Workshop NL.pptx
@@ -263,6 +263,10 @@
     </p:ext>
   </p:extLst>
 </p:presentation>
+</file>
+
+<file path=ppt/revisionInfo.xml><?xml version="1.0" encoding="utf-8"?>
+<p1510:revInfo xmlns:a="http://schemas.openxmlformats.org/drawingml/2006/main" xmlns:r="http://schemas.openxmlformats.org/officeDocument/2006/relationships" xmlns:p1510="http://schemas.microsoft.com/office/powerpoint/2015/10/main"/>
 </file>
 
 <file path=ppt/notesMasters/notesMaster1.xml><?xml version="1.0" encoding="utf-8"?>
@@ -13706,7 +13710,7 @@
             </a:pPr>
             <a:r>
               <a:rPr lang="nl-NL" dirty="0"/>
-              <a:t>1.  Laat de robot het </a:t>
+              <a:t>1. Laat de robot het </a:t>
             </a:r>
             <a:r>
               <a:rPr lang="nl-NL" dirty="0">
@@ -13806,8 +13810,8 @@
         </p:nvGrpSpPr>
         <p:grpSpPr>
           <a:xfrm>
-            <a:off x="2556803" y="2449349"/>
-            <a:ext cx="4030394" cy="2267097"/>
+            <a:off x="457200" y="2421213"/>
+            <a:ext cx="3295357" cy="1939771"/>
             <a:chOff x="2293033" y="2250390"/>
             <a:chExt cx="4030394" cy="2267097"/>
           </a:xfrm>
@@ -13891,6 +13895,148 @@
           </p:txBody>
         </p:sp>
       </p:grpSp>
+      <p:pic>
+        <p:nvPicPr>
+          <p:cNvPr id="2" name="Picture 1">
+            <a:extLst>
+              <a:ext uri="{FF2B5EF4-FFF2-40B4-BE49-F238E27FC236}">
+                <a16:creationId xmlns:a16="http://schemas.microsoft.com/office/drawing/2014/main" id="{BB7223D5-0FB2-4416-BD94-6CAD0B57A12A}"/>
+              </a:ext>
+            </a:extLst>
+          </p:cNvPr>
+          <p:cNvPicPr>
+            <a:picLocks noChangeAspect="1"/>
+          </p:cNvPicPr>
+          <p:nvPr/>
+        </p:nvPicPr>
+        <p:blipFill>
+          <a:blip r:embed="rId4"/>
+          <a:stretch>
+            <a:fillRect/>
+          </a:stretch>
+        </p:blipFill>
+        <p:spPr>
+          <a:xfrm>
+            <a:off x="3876967" y="2421213"/>
+            <a:ext cx="3796243" cy="2528414"/>
+          </a:xfrm>
+          <a:prstGeom prst="rect">
+            <a:avLst/>
+          </a:prstGeom>
+        </p:spPr>
+      </p:pic>
+      <p:sp>
+        <p:nvSpPr>
+          <p:cNvPr id="3" name="TextBox 2">
+            <a:extLst>
+              <a:ext uri="{FF2B5EF4-FFF2-40B4-BE49-F238E27FC236}">
+                <a16:creationId xmlns:a16="http://schemas.microsoft.com/office/drawing/2014/main" id="{91AFC277-EE70-4B87-BB07-BEBC996E4023}"/>
+              </a:ext>
+            </a:extLst>
+          </p:cNvPr>
+          <p:cNvSpPr txBox="1"/>
+          <p:nvPr/>
+        </p:nvSpPr>
+        <p:spPr>
+          <a:xfrm>
+            <a:off x="3836504" y="2176954"/>
+            <a:ext cx="3836706" cy="2646878"/>
+          </a:xfrm>
+          <a:prstGeom prst="rect">
+            <a:avLst/>
+          </a:prstGeom>
+          <a:noFill/>
+          <a:ln>
+            <a:solidFill>
+              <a:schemeClr val="tx2">
+                <a:lumMod val="90000"/>
+              </a:schemeClr>
+            </a:solidFill>
+          </a:ln>
+        </p:spPr>
+        <p:txBody>
+          <a:bodyPr wrap="square" rtlCol="0">
+            <a:spAutoFit/>
+          </a:bodyPr>
+          <a:lstStyle/>
+          <a:p>
+            <a:r>
+              <a:rPr lang="nl-NL" sz="2000" b="1" dirty="0">
+                <a:solidFill>
+                  <a:srgbClr val="FF9900"/>
+                </a:solidFill>
+              </a:rPr>
+              <a:t>TIP</a:t>
+            </a:r>
+          </a:p>
+          <a:p>
+            <a:endParaRPr lang="nl-NL" sz="2000" b="1" dirty="0">
+              <a:solidFill>
+                <a:srgbClr val="FF9900"/>
+              </a:solidFill>
+            </a:endParaRPr>
+          </a:p>
+          <a:p>
+            <a:endParaRPr lang="en-US" dirty="0">
+              <a:solidFill>
+                <a:srgbClr val="FF9900"/>
+              </a:solidFill>
+            </a:endParaRPr>
+          </a:p>
+          <a:p>
+            <a:endParaRPr lang="en-US" dirty="0">
+              <a:solidFill>
+                <a:srgbClr val="FF9900"/>
+              </a:solidFill>
+            </a:endParaRPr>
+          </a:p>
+          <a:p>
+            <a:endParaRPr lang="en-US" dirty="0">
+              <a:solidFill>
+                <a:srgbClr val="FF9900"/>
+              </a:solidFill>
+            </a:endParaRPr>
+          </a:p>
+          <a:p>
+            <a:endParaRPr lang="en-US" dirty="0">
+              <a:solidFill>
+                <a:srgbClr val="FF9900"/>
+              </a:solidFill>
+            </a:endParaRPr>
+          </a:p>
+          <a:p>
+            <a:endParaRPr lang="en-US" dirty="0">
+              <a:solidFill>
+                <a:srgbClr val="FF9900"/>
+              </a:solidFill>
+            </a:endParaRPr>
+          </a:p>
+          <a:p>
+            <a:endParaRPr lang="en-US" dirty="0">
+              <a:solidFill>
+                <a:srgbClr val="FF9900"/>
+              </a:solidFill>
+            </a:endParaRPr>
+          </a:p>
+          <a:p>
+            <a:endParaRPr lang="en-US" dirty="0">
+              <a:solidFill>
+                <a:srgbClr val="FF9900"/>
+              </a:solidFill>
+            </a:endParaRPr>
+          </a:p>
+          <a:p>
+            <a:endParaRPr lang="en-US" dirty="0">
+              <a:solidFill>
+                <a:srgbClr val="FF9900"/>
+              </a:solidFill>
+            </a:endParaRPr>
+          </a:p>
+          <a:p>
+            <a:endParaRPr lang="nl-NL" dirty="0"/>
+          </a:p>
+        </p:txBody>
+      </p:sp>
     </p:spTree>
     <p:extLst>
       <p:ext uri="{BB962C8B-B14F-4D97-AF65-F5344CB8AC3E}">

</xml_diff>